<commit_message>
Update `Clocks synchronization` presentation & diagram
</commit_message>
<xml_diff>
--- a/presentations/Clocks synchronization/Clocks synchronization.pptx
+++ b/presentations/Clocks synchronization/Clocks synchronization.pptx
@@ -206,7 +206,7 @@
           <a:p>
             <a:fld id="{AB38CBBD-EAB1-4428-98C8-CD4059990712}" type="datetimeFigureOut">
               <a:rPr lang="en-US" smtClean="0"/>
-              <a:t>8/12/2025</a:t>
+              <a:t>8/22/2025</a:t>
             </a:fld>
             <a:endParaRPr lang="en-US"/>
           </a:p>
@@ -818,7 +818,7 @@
             </a:r>
             <a:r>
               <a:rPr lang="en-US" dirty="0"/>
-              <a:t>that are far apart. Fortunately, you can synchronize two servers clocks fairly</a:t>
+              <a:t>that are far apart. Fortunately, you can synchronize two servers' clocks fairly</a:t>
             </a:r>
             <a:r>
               <a:rPr lang="ru-RU" dirty="0"/>
@@ -1062,6 +1062,15 @@
           <a:p>
             <a:r>
               <a:rPr lang="en-US" dirty="0"/>
+              <a:t>0. Server B initiate communication by asking time of server A</a:t>
+            </a:r>
+          </a:p>
+          <a:p>
+            <a:endParaRPr lang="en-US" dirty="0"/>
+          </a:p>
+          <a:p>
+            <a:r>
+              <a:rPr lang="en-US" dirty="0"/>
               <a:t>1. Server A sends server B a message containing TA1 (the current time according to server A).</a:t>
             </a:r>
           </a:p>
@@ -1754,7 +1763,7 @@
           <a:p>
             <a:fld id="{AE41A97A-CF3D-4BF5-AF91-C141EE15AC35}" type="datetimeFigureOut">
               <a:rPr lang="en-US" smtClean="0"/>
-              <a:t>8/12/2025</a:t>
+              <a:t>8/22/2025</a:t>
             </a:fld>
             <a:endParaRPr lang="en-US"/>
           </a:p>
@@ -1952,7 +1961,7 @@
           <a:p>
             <a:fld id="{AE41A97A-CF3D-4BF5-AF91-C141EE15AC35}" type="datetimeFigureOut">
               <a:rPr lang="en-US" smtClean="0"/>
-              <a:t>8/12/2025</a:t>
+              <a:t>8/22/2025</a:t>
             </a:fld>
             <a:endParaRPr lang="en-US"/>
           </a:p>
@@ -2160,7 +2169,7 @@
           <a:p>
             <a:fld id="{AE41A97A-CF3D-4BF5-AF91-C141EE15AC35}" type="datetimeFigureOut">
               <a:rPr lang="en-US" smtClean="0"/>
-              <a:t>8/12/2025</a:t>
+              <a:t>8/22/2025</a:t>
             </a:fld>
             <a:endParaRPr lang="en-US"/>
           </a:p>
@@ -2358,7 +2367,7 @@
           <a:p>
             <a:fld id="{AE41A97A-CF3D-4BF5-AF91-C141EE15AC35}" type="datetimeFigureOut">
               <a:rPr lang="en-US" smtClean="0"/>
-              <a:t>8/12/2025</a:t>
+              <a:t>8/22/2025</a:t>
             </a:fld>
             <a:endParaRPr lang="en-US"/>
           </a:p>
@@ -2633,7 +2642,7 @@
           <a:p>
             <a:fld id="{AE41A97A-CF3D-4BF5-AF91-C141EE15AC35}" type="datetimeFigureOut">
               <a:rPr lang="en-US" smtClean="0"/>
-              <a:t>8/12/2025</a:t>
+              <a:t>8/22/2025</a:t>
             </a:fld>
             <a:endParaRPr lang="en-US"/>
           </a:p>
@@ -2898,7 +2907,7 @@
           <a:p>
             <a:fld id="{AE41A97A-CF3D-4BF5-AF91-C141EE15AC35}" type="datetimeFigureOut">
               <a:rPr lang="en-US" smtClean="0"/>
-              <a:t>8/12/2025</a:t>
+              <a:t>8/22/2025</a:t>
             </a:fld>
             <a:endParaRPr lang="en-US"/>
           </a:p>
@@ -3310,7 +3319,7 @@
           <a:p>
             <a:fld id="{AE41A97A-CF3D-4BF5-AF91-C141EE15AC35}" type="datetimeFigureOut">
               <a:rPr lang="en-US" smtClean="0"/>
-              <a:t>8/12/2025</a:t>
+              <a:t>8/22/2025</a:t>
             </a:fld>
             <a:endParaRPr lang="en-US"/>
           </a:p>
@@ -3451,7 +3460,7 @@
           <a:p>
             <a:fld id="{AE41A97A-CF3D-4BF5-AF91-C141EE15AC35}" type="datetimeFigureOut">
               <a:rPr lang="en-US" smtClean="0"/>
-              <a:t>8/12/2025</a:t>
+              <a:t>8/22/2025</a:t>
             </a:fld>
             <a:endParaRPr lang="en-US"/>
           </a:p>
@@ -3564,7 +3573,7 @@
           <a:p>
             <a:fld id="{AE41A97A-CF3D-4BF5-AF91-C141EE15AC35}" type="datetimeFigureOut">
               <a:rPr lang="en-US" smtClean="0"/>
-              <a:t>8/12/2025</a:t>
+              <a:t>8/22/2025</a:t>
             </a:fld>
             <a:endParaRPr lang="en-US"/>
           </a:p>
@@ -3875,7 +3884,7 @@
           <a:p>
             <a:fld id="{AE41A97A-CF3D-4BF5-AF91-C141EE15AC35}" type="datetimeFigureOut">
               <a:rPr lang="en-US" smtClean="0"/>
-              <a:t>8/12/2025</a:t>
+              <a:t>8/22/2025</a:t>
             </a:fld>
             <a:endParaRPr lang="en-US"/>
           </a:p>
@@ -4163,7 +4172,7 @@
           <a:p>
             <a:fld id="{AE41A97A-CF3D-4BF5-AF91-C141EE15AC35}" type="datetimeFigureOut">
               <a:rPr lang="en-US" smtClean="0"/>
-              <a:t>8/12/2025</a:t>
+              <a:t>8/22/2025</a:t>
             </a:fld>
             <a:endParaRPr lang="en-US"/>
           </a:p>
@@ -4404,7 +4413,7 @@
           <a:p>
             <a:fld id="{AE41A97A-CF3D-4BF5-AF91-C141EE15AC35}" type="datetimeFigureOut">
               <a:rPr lang="en-US" smtClean="0"/>
-              <a:t>8/12/2025</a:t>
+              <a:t>8/22/2025</a:t>
             </a:fld>
             <a:endParaRPr lang="en-US"/>
           </a:p>
@@ -4937,19 +4946,17 @@
       </p:grpSpPr>
       <p:pic>
         <p:nvPicPr>
-          <p:cNvPr id="3" name="Content Placeholder 6">
-            <a:extLst>
-              <a:ext uri="{FF2B5EF4-FFF2-40B4-BE49-F238E27FC236}">
-                <a16:creationId xmlns:a16="http://schemas.microsoft.com/office/drawing/2014/main" id="{E7249627-5419-4A7C-9521-79108B5CCF55}"/>
+          <p:cNvPr id="4" name="Picture 3">
+            <a:extLst>
+              <a:ext uri="{FF2B5EF4-FFF2-40B4-BE49-F238E27FC236}">
+                <a16:creationId xmlns:a16="http://schemas.microsoft.com/office/drawing/2014/main" id="{E68D385C-DDD5-4C09-B4AE-8BE70247D913}"/>
               </a:ext>
             </a:extLst>
           </p:cNvPr>
           <p:cNvPicPr>
-            <a:picLocks noGrp="1" noChangeAspect="1"/>
+            <a:picLocks noChangeAspect="1"/>
           </p:cNvPicPr>
-          <p:nvPr>
-            <p:ph idx="1"/>
-          </p:nvPr>
+          <p:nvPr/>
         </p:nvPicPr>
         <p:blipFill>
           <a:blip r:embed="rId3"/>
@@ -4959,24 +4966,29 @@
         </p:blipFill>
         <p:spPr>
           <a:xfrm>
-            <a:off x="671565" y="875441"/>
-            <a:ext cx="10567227" cy="4885219"/>
+            <a:off x="6796636" y="5863609"/>
+            <a:ext cx="5086350" cy="619125"/>
           </a:xfrm>
+          <a:prstGeom prst="rect">
+            <a:avLst/>
+          </a:prstGeom>
         </p:spPr>
       </p:pic>
       <p:pic>
         <p:nvPicPr>
-          <p:cNvPr id="4" name="Picture 3">
-            <a:extLst>
-              <a:ext uri="{FF2B5EF4-FFF2-40B4-BE49-F238E27FC236}">
-                <a16:creationId xmlns:a16="http://schemas.microsoft.com/office/drawing/2014/main" id="{E68D385C-DDD5-4C09-B4AE-8BE70247D913}"/>
+          <p:cNvPr id="7" name="Content Placeholder 6">
+            <a:extLst>
+              <a:ext uri="{FF2B5EF4-FFF2-40B4-BE49-F238E27FC236}">
+                <a16:creationId xmlns:a16="http://schemas.microsoft.com/office/drawing/2014/main" id="{48BD1B1E-595B-70F0-D3B0-863EBA4B6B8E}"/>
               </a:ext>
             </a:extLst>
           </p:cNvPr>
           <p:cNvPicPr>
-            <a:picLocks noChangeAspect="1"/>
+            <a:picLocks noGrp="1" noChangeAspect="1"/>
           </p:cNvPicPr>
-          <p:nvPr/>
+          <p:nvPr>
+            <p:ph idx="1"/>
+          </p:nvPr>
         </p:nvPicPr>
         <p:blipFill>
           <a:blip r:embed="rId4"/>
@@ -4986,8 +4998,8 @@
         </p:blipFill>
         <p:spPr>
           <a:xfrm>
-            <a:off x="6434085" y="5672996"/>
-            <a:ext cx="5086350" cy="619125"/>
+            <a:off x="309014" y="464554"/>
+            <a:ext cx="11573972" cy="5350637"/>
           </a:xfrm>
           <a:prstGeom prst="rect">
             <a:avLst/>
@@ -5107,8 +5119,8 @@
         </p:blipFill>
         <p:spPr>
           <a:xfrm>
-            <a:off x="1781093" y="1180332"/>
-            <a:ext cx="8629814" cy="5055576"/>
+            <a:off x="1638939" y="817934"/>
+            <a:ext cx="8914121" cy="5222131"/>
           </a:xfrm>
         </p:spPr>
       </p:pic>
@@ -5144,10 +5156,10 @@
       </p:grpSpPr>
       <p:pic>
         <p:nvPicPr>
-          <p:cNvPr id="7" name="Content Placeholder 6">
-            <a:extLst>
-              <a:ext uri="{FF2B5EF4-FFF2-40B4-BE49-F238E27FC236}">
-                <a16:creationId xmlns:a16="http://schemas.microsoft.com/office/drawing/2014/main" id="{7B5A0DD1-94D9-4C44-BF2B-DFE6E9EE50E8}"/>
+          <p:cNvPr id="5" name="Content Placeholder 4">
+            <a:extLst>
+              <a:ext uri="{FF2B5EF4-FFF2-40B4-BE49-F238E27FC236}">
+                <a16:creationId xmlns:a16="http://schemas.microsoft.com/office/drawing/2014/main" id="{89CD256C-7A5D-523B-B4B6-A2F77BEA9A95}"/>
               </a:ext>
             </a:extLst>
           </p:cNvPr>
@@ -5166,9 +5178,12 @@
         </p:blipFill>
         <p:spPr>
           <a:xfrm>
-            <a:off x="2293495" y="919332"/>
-            <a:ext cx="9490725" cy="5333991"/>
+            <a:off x="2149480" y="669528"/>
+            <a:ext cx="9819810" cy="5518944"/>
           </a:xfrm>
+          <a:prstGeom prst="rect">
+            <a:avLst/>
+          </a:prstGeom>
         </p:spPr>
       </p:pic>
     </p:spTree>
@@ -5203,10 +5218,10 @@
       </p:grpSpPr>
       <p:pic>
         <p:nvPicPr>
-          <p:cNvPr id="5" name="Content Placeholder 4">
-            <a:extLst>
-              <a:ext uri="{FF2B5EF4-FFF2-40B4-BE49-F238E27FC236}">
-                <a16:creationId xmlns:a16="http://schemas.microsoft.com/office/drawing/2014/main" id="{E54ED97A-34B5-4B60-859B-1B530A404CB1}"/>
+          <p:cNvPr id="8" name="Content Placeholder 7">
+            <a:extLst>
+              <a:ext uri="{FF2B5EF4-FFF2-40B4-BE49-F238E27FC236}">
+                <a16:creationId xmlns:a16="http://schemas.microsoft.com/office/drawing/2014/main" id="{27FED564-662E-7295-8E04-24A8C983EF91}"/>
               </a:ext>
             </a:extLst>
           </p:cNvPr>
@@ -5225,9 +5240,12 @@
         </p:blipFill>
         <p:spPr>
           <a:xfrm>
-            <a:off x="504349" y="1005915"/>
-            <a:ext cx="11183302" cy="5170031"/>
+            <a:off x="162181" y="800100"/>
+            <a:ext cx="11867638" cy="5486399"/>
           </a:xfrm>
+          <a:prstGeom prst="rect">
+            <a:avLst/>
+          </a:prstGeom>
         </p:spPr>
       </p:pic>
     </p:spTree>
@@ -5262,10 +5280,10 @@
       </p:grpSpPr>
       <p:pic>
         <p:nvPicPr>
-          <p:cNvPr id="7" name="Content Placeholder 6">
-            <a:extLst>
-              <a:ext uri="{FF2B5EF4-FFF2-40B4-BE49-F238E27FC236}">
-                <a16:creationId xmlns:a16="http://schemas.microsoft.com/office/drawing/2014/main" id="{682ADE1E-BAA4-40F2-AB3C-CE5B5A81D2EE}"/>
+          <p:cNvPr id="5" name="Content Placeholder 4">
+            <a:extLst>
+              <a:ext uri="{FF2B5EF4-FFF2-40B4-BE49-F238E27FC236}">
+                <a16:creationId xmlns:a16="http://schemas.microsoft.com/office/drawing/2014/main" id="{0A83E0DF-9B62-2794-094B-FED26D5960DA}"/>
               </a:ext>
             </a:extLst>
           </p:cNvPr>
@@ -5284,9 +5302,12 @@
         </p:blipFill>
         <p:spPr>
           <a:xfrm>
-            <a:off x="326009" y="871004"/>
-            <a:ext cx="11539981" cy="5334923"/>
+            <a:off x="315685" y="756766"/>
+            <a:ext cx="11560629" cy="5344468"/>
           </a:xfrm>
+          <a:prstGeom prst="rect">
+            <a:avLst/>
+          </a:prstGeom>
         </p:spPr>
       </p:pic>
     </p:spTree>
@@ -5402,7 +5423,7 @@
         </p:blipFill>
         <p:spPr>
           <a:xfrm>
-            <a:off x="3239215" y="1388893"/>
+            <a:off x="3459070" y="742806"/>
             <a:ext cx="5713569" cy="1714072"/>
           </a:xfrm>
         </p:spPr>
@@ -5429,7 +5450,7 @@
         </p:blipFill>
         <p:spPr>
           <a:xfrm>
-            <a:off x="374754" y="4094293"/>
+            <a:off x="439711" y="4286022"/>
             <a:ext cx="11752289" cy="1539773"/>
           </a:xfrm>
           <a:prstGeom prst="rect">
@@ -5437,6 +5458,52 @@
           </a:prstGeom>
         </p:spPr>
       </p:pic>
+      <p:sp>
+        <p:nvSpPr>
+          <p:cNvPr id="2" name="Arrow: Down 1">
+            <a:extLst>
+              <a:ext uri="{FF2B5EF4-FFF2-40B4-BE49-F238E27FC236}">
+                <a16:creationId xmlns:a16="http://schemas.microsoft.com/office/drawing/2014/main" id="{706F12F5-C512-B167-9B6D-DC1435770FAB}"/>
+              </a:ext>
+            </a:extLst>
+          </p:cNvPr>
+          <p:cNvSpPr/>
+          <p:nvPr/>
+        </p:nvSpPr>
+        <p:spPr>
+          <a:xfrm>
+            <a:off x="5277463" y="2954023"/>
+            <a:ext cx="1637071" cy="834854"/>
+          </a:xfrm>
+          <a:prstGeom prst="downArrow">
+            <a:avLst/>
+          </a:prstGeom>
+        </p:spPr>
+        <p:style>
+          <a:lnRef idx="2">
+            <a:schemeClr val="accent1">
+              <a:shade val="15000"/>
+            </a:schemeClr>
+          </a:lnRef>
+          <a:fillRef idx="1">
+            <a:schemeClr val="accent1"/>
+          </a:fillRef>
+          <a:effectRef idx="0">
+            <a:schemeClr val="accent1"/>
+          </a:effectRef>
+          <a:fontRef idx="minor">
+            <a:schemeClr val="lt1"/>
+          </a:fontRef>
+        </p:style>
+        <p:txBody>
+          <a:bodyPr rtlCol="0" anchor="ctr"/>
+          <a:lstStyle/>
+          <a:p>
+            <a:pPr algn="ctr"/>
+            <a:endParaRPr lang="en-US"/>
+          </a:p>
+        </p:txBody>
+      </p:sp>
     </p:spTree>
     <p:extLst>
       <p:ext uri="{BB962C8B-B14F-4D97-AF65-F5344CB8AC3E}">
@@ -5489,8 +5556,84 @@
         </p:blipFill>
         <p:spPr>
           <a:xfrm>
-            <a:off x="1682949" y="2480266"/>
+            <a:off x="1682947" y="4097081"/>
             <a:ext cx="8826102" cy="1897468"/>
+          </a:xfrm>
+          <a:prstGeom prst="rect">
+            <a:avLst/>
+          </a:prstGeom>
+        </p:spPr>
+      </p:pic>
+      <p:sp>
+        <p:nvSpPr>
+          <p:cNvPr id="4" name="Arrow: Down 3">
+            <a:extLst>
+              <a:ext uri="{FF2B5EF4-FFF2-40B4-BE49-F238E27FC236}">
+                <a16:creationId xmlns:a16="http://schemas.microsoft.com/office/drawing/2014/main" id="{C052B89A-933B-FA59-5310-88B6E9B8A3F2}"/>
+              </a:ext>
+            </a:extLst>
+          </p:cNvPr>
+          <p:cNvSpPr/>
+          <p:nvPr/>
+        </p:nvSpPr>
+        <p:spPr>
+          <a:xfrm>
+            <a:off x="5277463" y="2843902"/>
+            <a:ext cx="1637071" cy="834854"/>
+          </a:xfrm>
+          <a:prstGeom prst="downArrow">
+            <a:avLst/>
+          </a:prstGeom>
+        </p:spPr>
+        <p:style>
+          <a:lnRef idx="2">
+            <a:schemeClr val="accent1">
+              <a:shade val="15000"/>
+            </a:schemeClr>
+          </a:lnRef>
+          <a:fillRef idx="1">
+            <a:schemeClr val="accent1"/>
+          </a:fillRef>
+          <a:effectRef idx="0">
+            <a:schemeClr val="accent1"/>
+          </a:effectRef>
+          <a:fontRef idx="minor">
+            <a:schemeClr val="lt1"/>
+          </a:fontRef>
+        </p:style>
+        <p:txBody>
+          <a:bodyPr rtlCol="0" anchor="ctr"/>
+          <a:lstStyle/>
+          <a:p>
+            <a:pPr algn="ctr"/>
+            <a:endParaRPr lang="en-US"/>
+          </a:p>
+        </p:txBody>
+      </p:sp>
+      <p:pic>
+        <p:nvPicPr>
+          <p:cNvPr id="2" name="Picture 1">
+            <a:extLst>
+              <a:ext uri="{FF2B5EF4-FFF2-40B4-BE49-F238E27FC236}">
+                <a16:creationId xmlns:a16="http://schemas.microsoft.com/office/drawing/2014/main" id="{FEAC5E1B-5570-385E-F3D6-31D91FD54B36}"/>
+              </a:ext>
+            </a:extLst>
+          </p:cNvPr>
+          <p:cNvPicPr>
+            <a:picLocks noChangeAspect="1"/>
+          </p:cNvPicPr>
+          <p:nvPr/>
+        </p:nvPicPr>
+        <p:blipFill>
+          <a:blip r:embed="rId4"/>
+          <a:stretch>
+            <a:fillRect/>
+          </a:stretch>
+        </p:blipFill>
+        <p:spPr>
+          <a:xfrm>
+            <a:off x="439711" y="863451"/>
+            <a:ext cx="11752289" cy="1539773"/>
           </a:xfrm>
           <a:prstGeom prst="rect">
             <a:avLst/>

</xml_diff>